<commit_message>
Added link for WebViewer Tutorial
</commit_message>
<xml_diff>
--- a/COW Tutorial.pptx
+++ b/COW Tutorial.pptx
@@ -204,7 +204,7 @@
           <a:p>
             <a:fld id="{DB4E2C72-82A7-0842-A0F3-36777F825109}" type="datetimeFigureOut">
               <a:rPr lang="en-US" smtClean="0"/>
-              <a:t>3/29/24</a:t>
+              <a:t>5/10/24</a:t>
             </a:fld>
             <a:endParaRPr lang="en-US"/>
           </a:p>
@@ -1385,7 +1385,7 @@
           <a:p>
             <a:fld id="{C3276FF0-D853-A34C-992C-9D1128225E1A}" type="datetimeFigureOut">
               <a:rPr lang="en-US" smtClean="0"/>
-              <a:t>3/29/24</a:t>
+              <a:t>5/10/24</a:t>
             </a:fld>
             <a:endParaRPr lang="en-US"/>
           </a:p>
@@ -1565,7 +1565,7 @@
           <a:p>
             <a:fld id="{C3276FF0-D853-A34C-992C-9D1128225E1A}" type="datetimeFigureOut">
               <a:rPr lang="en-US" smtClean="0"/>
-              <a:t>3/29/24</a:t>
+              <a:t>5/10/24</a:t>
             </a:fld>
             <a:endParaRPr lang="en-US"/>
           </a:p>
@@ -1942,7 +1942,7 @@
           <a:p>
             <a:fld id="{C3276FF0-D853-A34C-992C-9D1128225E1A}" type="datetimeFigureOut">
               <a:rPr lang="en-US" smtClean="0"/>
-              <a:t>3/29/24</a:t>
+              <a:t>5/10/24</a:t>
             </a:fld>
             <a:endParaRPr lang="en-US"/>
           </a:p>
@@ -2174,7 +2174,7 @@
           <a:p>
             <a:fld id="{C3276FF0-D853-A34C-992C-9D1128225E1A}" type="datetimeFigureOut">
               <a:rPr lang="en-US" smtClean="0"/>
-              <a:t>3/29/24</a:t>
+              <a:t>5/10/24</a:t>
             </a:fld>
             <a:endParaRPr lang="en-US"/>
           </a:p>
@@ -2541,7 +2541,7 @@
           <a:p>
             <a:fld id="{C3276FF0-D853-A34C-992C-9D1128225E1A}" type="datetimeFigureOut">
               <a:rPr lang="en-US" smtClean="0"/>
-              <a:t>3/29/24</a:t>
+              <a:t>5/10/24</a:t>
             </a:fld>
             <a:endParaRPr lang="en-US"/>
           </a:p>
@@ -2659,7 +2659,7 @@
           <a:p>
             <a:fld id="{C3276FF0-D853-A34C-992C-9D1128225E1A}" type="datetimeFigureOut">
               <a:rPr lang="en-US" smtClean="0"/>
-              <a:t>3/29/24</a:t>
+              <a:t>5/10/24</a:t>
             </a:fld>
             <a:endParaRPr lang="en-US"/>
           </a:p>
@@ -2754,7 +2754,7 @@
           <a:p>
             <a:fld id="{C3276FF0-D853-A34C-992C-9D1128225E1A}" type="datetimeFigureOut">
               <a:rPr lang="en-US" smtClean="0"/>
-              <a:t>3/29/24</a:t>
+              <a:t>5/10/24</a:t>
             </a:fld>
             <a:endParaRPr lang="en-US"/>
           </a:p>
@@ -3031,7 +3031,7 @@
           <a:p>
             <a:fld id="{C3276FF0-D853-A34C-992C-9D1128225E1A}" type="datetimeFigureOut">
               <a:rPr lang="en-US" smtClean="0"/>
-              <a:t>3/29/24</a:t>
+              <a:t>5/10/24</a:t>
             </a:fld>
             <a:endParaRPr lang="en-US"/>
           </a:p>
@@ -3288,7 +3288,7 @@
           <a:p>
             <a:fld id="{C3276FF0-D853-A34C-992C-9D1128225E1A}" type="datetimeFigureOut">
               <a:rPr lang="en-US" smtClean="0"/>
-              <a:t>3/29/24</a:t>
+              <a:t>5/10/24</a:t>
             </a:fld>
             <a:endParaRPr lang="en-US"/>
           </a:p>
@@ -3501,7 +3501,7 @@
           <a:p>
             <a:fld id="{C3276FF0-D853-A34C-992C-9D1128225E1A}" type="datetimeFigureOut">
               <a:rPr lang="en-US" smtClean="0"/>
-              <a:t>3/29/24</a:t>
+              <a:t>5/10/24</a:t>
             </a:fld>
             <a:endParaRPr lang="en-US"/>
           </a:p>
@@ -7489,6 +7489,47 @@
           </p:txBody>
         </p:sp>
       </p:grpSp>
+      <p:sp>
+        <p:nvSpPr>
+          <p:cNvPr id="13" name="TextBox 12">
+            <a:extLst>
+              <a:ext uri="{FF2B5EF4-FFF2-40B4-BE49-F238E27FC236}">
+                <a16:creationId xmlns:a16="http://schemas.microsoft.com/office/drawing/2014/main" id="{887F3DC5-8390-7E25-1224-AE8C20F9B133}"/>
+              </a:ext>
+            </a:extLst>
+          </p:cNvPr>
+          <p:cNvSpPr txBox="1"/>
+          <p:nvPr/>
+        </p:nvSpPr>
+        <p:spPr>
+          <a:xfrm>
+            <a:off x="5461569" y="6431255"/>
+            <a:ext cx="3485506" cy="369332"/>
+          </a:xfrm>
+          <a:prstGeom prst="rect">
+            <a:avLst/>
+          </a:prstGeom>
+          <a:noFill/>
+        </p:spPr>
+        <p:txBody>
+          <a:bodyPr wrap="none" rtlCol="0">
+            <a:spAutoFit/>
+          </a:bodyPr>
+          <a:lstStyle/>
+          <a:p>
+            <a:r>
+              <a:rPr lang="en-US" dirty="0">
+                <a:latin typeface="Helvetica" pitchFamily="2" charset="0"/>
+                <a:hlinkClick r:id="rId3"/>
+              </a:rPr>
+              <a:t>PowerPoint Web Viewer Tutorial</a:t>
+            </a:r>
+            <a:endParaRPr lang="en-US" dirty="0">
+              <a:latin typeface="Helvetica" pitchFamily="2" charset="0"/>
+            </a:endParaRPr>
+          </a:p>
+        </p:txBody>
+      </p:sp>
     </p:spTree>
     <p:extLst>
       <p:ext uri="{BB962C8B-B14F-4D97-AF65-F5344CB8AC3E}">

</xml_diff>